<commit_message>
Added sth about linreg.
</commit_message>
<xml_diff>
--- a/source/math_linreg2/presentation.pptx
+++ b/source/math_linreg2/presentation.pptx
@@ -7,6 +7,7 @@
   <p:sldIdLst>
     <p:sldId id="256" r:id="rId2"/>
     <p:sldId id="257" r:id="rId3"/>
+    <p:sldId id="258" r:id="rId4"/>
   </p:sldIdLst>
   <p:sldSz cx="12192000" cy="6858000"/>
   <p:notesSz cx="6858000" cy="9144000"/>
@@ -244,7 +245,7 @@
           <a:p>
             <a:fld id="{392C9B3B-BE4C-4AF9-88E6-3D240774DD5C}" type="datetimeFigureOut">
               <a:rPr lang="pl-PL" smtClean="0"/>
-              <a:t>2020-06-12</a:t>
+              <a:t>2020-06-19</a:t>
             </a:fld>
             <a:endParaRPr lang="pl-PL"/>
           </a:p>
@@ -414,7 +415,7 @@
           <a:p>
             <a:fld id="{392C9B3B-BE4C-4AF9-88E6-3D240774DD5C}" type="datetimeFigureOut">
               <a:rPr lang="pl-PL" smtClean="0"/>
-              <a:t>2020-06-12</a:t>
+              <a:t>2020-06-19</a:t>
             </a:fld>
             <a:endParaRPr lang="pl-PL"/>
           </a:p>
@@ -594,7 +595,7 @@
           <a:p>
             <a:fld id="{392C9B3B-BE4C-4AF9-88E6-3D240774DD5C}" type="datetimeFigureOut">
               <a:rPr lang="pl-PL" smtClean="0"/>
-              <a:t>2020-06-12</a:t>
+              <a:t>2020-06-19</a:t>
             </a:fld>
             <a:endParaRPr lang="pl-PL"/>
           </a:p>
@@ -764,7 +765,7 @@
           <a:p>
             <a:fld id="{392C9B3B-BE4C-4AF9-88E6-3D240774DD5C}" type="datetimeFigureOut">
               <a:rPr lang="pl-PL" smtClean="0"/>
-              <a:t>2020-06-12</a:t>
+              <a:t>2020-06-19</a:t>
             </a:fld>
             <a:endParaRPr lang="pl-PL"/>
           </a:p>
@@ -1010,7 +1011,7 @@
           <a:p>
             <a:fld id="{392C9B3B-BE4C-4AF9-88E6-3D240774DD5C}" type="datetimeFigureOut">
               <a:rPr lang="pl-PL" smtClean="0"/>
-              <a:t>2020-06-12</a:t>
+              <a:t>2020-06-19</a:t>
             </a:fld>
             <a:endParaRPr lang="pl-PL"/>
           </a:p>
@@ -1242,7 +1243,7 @@
           <a:p>
             <a:fld id="{392C9B3B-BE4C-4AF9-88E6-3D240774DD5C}" type="datetimeFigureOut">
               <a:rPr lang="pl-PL" smtClean="0"/>
-              <a:t>2020-06-12</a:t>
+              <a:t>2020-06-19</a:t>
             </a:fld>
             <a:endParaRPr lang="pl-PL"/>
           </a:p>
@@ -1609,7 +1610,7 @@
           <a:p>
             <a:fld id="{392C9B3B-BE4C-4AF9-88E6-3D240774DD5C}" type="datetimeFigureOut">
               <a:rPr lang="pl-PL" smtClean="0"/>
-              <a:t>2020-06-12</a:t>
+              <a:t>2020-06-19</a:t>
             </a:fld>
             <a:endParaRPr lang="pl-PL"/>
           </a:p>
@@ -1727,7 +1728,7 @@
           <a:p>
             <a:fld id="{392C9B3B-BE4C-4AF9-88E6-3D240774DD5C}" type="datetimeFigureOut">
               <a:rPr lang="pl-PL" smtClean="0"/>
-              <a:t>2020-06-12</a:t>
+              <a:t>2020-06-19</a:t>
             </a:fld>
             <a:endParaRPr lang="pl-PL"/>
           </a:p>
@@ -1822,7 +1823,7 @@
           <a:p>
             <a:fld id="{392C9B3B-BE4C-4AF9-88E6-3D240774DD5C}" type="datetimeFigureOut">
               <a:rPr lang="pl-PL" smtClean="0"/>
-              <a:t>2020-06-12</a:t>
+              <a:t>2020-06-19</a:t>
             </a:fld>
             <a:endParaRPr lang="pl-PL"/>
           </a:p>
@@ -2099,7 +2100,7 @@
           <a:p>
             <a:fld id="{392C9B3B-BE4C-4AF9-88E6-3D240774DD5C}" type="datetimeFigureOut">
               <a:rPr lang="pl-PL" smtClean="0"/>
-              <a:t>2020-06-12</a:t>
+              <a:t>2020-06-19</a:t>
             </a:fld>
             <a:endParaRPr lang="pl-PL"/>
           </a:p>
@@ -2352,7 +2353,7 @@
           <a:p>
             <a:fld id="{392C9B3B-BE4C-4AF9-88E6-3D240774DD5C}" type="datetimeFigureOut">
               <a:rPr lang="pl-PL" smtClean="0"/>
-              <a:t>2020-06-12</a:t>
+              <a:t>2020-06-19</a:t>
             </a:fld>
             <a:endParaRPr lang="pl-PL"/>
           </a:p>
@@ -2565,7 +2566,7 @@
           <a:p>
             <a:fld id="{392C9B3B-BE4C-4AF9-88E6-3D240774DD5C}" type="datetimeFigureOut">
               <a:rPr lang="pl-PL" smtClean="0"/>
-              <a:t>2020-06-12</a:t>
+              <a:t>2020-06-19</a:t>
             </a:fld>
             <a:endParaRPr lang="pl-PL"/>
           </a:p>
@@ -3316,6 +3317,218 @@
 </p:sld>
 </file>
 
+<file path=ppt/slides/slide3.xml><?xml version="1.0" encoding="utf-8"?>
+<p:sld xmlns:a="http://schemas.openxmlformats.org/drawingml/2006/main" xmlns:r="http://schemas.openxmlformats.org/officeDocument/2006/relationships" xmlns:p="http://schemas.openxmlformats.org/presentationml/2006/main">
+  <p:cSld>
+    <p:spTree>
+      <p:nvGrpSpPr>
+        <p:cNvPr id="1" name=""/>
+        <p:cNvGrpSpPr/>
+        <p:nvPr/>
+      </p:nvGrpSpPr>
+      <p:grpSpPr>
+        <a:xfrm>
+          <a:off x="0" y="0"/>
+          <a:ext cx="0" cy="0"/>
+          <a:chOff x="0" y="0"/>
+          <a:chExt cx="0" cy="0"/>
+        </a:xfrm>
+      </p:grpSpPr>
+      <p:sp>
+        <p:nvSpPr>
+          <p:cNvPr id="2" name="Title 1"/>
+          <p:cNvSpPr>
+            <a:spLocks noGrp="1"/>
+          </p:cNvSpPr>
+          <p:nvPr>
+            <p:ph type="title"/>
+          </p:nvPr>
+        </p:nvSpPr>
+        <p:spPr/>
+        <p:txBody>
+          <a:bodyPr/>
+          <a:lstStyle/>
+          <a:p>
+            <a:r>
+              <a:rPr lang="pl-PL" dirty="0" smtClean="0"/>
+              <a:t>P value - znaczenie</a:t>
+            </a:r>
+            <a:endParaRPr lang="pl-PL" dirty="0"/>
+          </a:p>
+        </p:txBody>
+      </p:sp>
+      <p:sp>
+        <p:nvSpPr>
+          <p:cNvPr id="3" name="Content Placeholder 2"/>
+          <p:cNvSpPr>
+            <a:spLocks noGrp="1"/>
+          </p:cNvSpPr>
+          <p:nvPr>
+            <p:ph idx="1"/>
+          </p:nvPr>
+        </p:nvSpPr>
+        <p:spPr/>
+        <p:txBody>
+          <a:bodyPr>
+            <a:normAutofit/>
+          </a:bodyPr>
+          <a:lstStyle/>
+          <a:p>
+            <a:pPr marL="0" indent="0">
+              <a:buNone/>
+            </a:pPr>
+            <a:r>
+              <a:rPr lang="pl-PL" sz="1800" dirty="0" smtClean="0"/>
+              <a:t>Wylosowałeś do swojego modelowania jakąś próbkę. Nie wiesz, czy ta próbka jest reprezentatywna, czy raczej skrajna w stosunku do całej populacji.</a:t>
+            </a:r>
+          </a:p>
+          <a:p>
+            <a:pPr marL="0" indent="0">
+              <a:buNone/>
+            </a:pPr>
+            <a:r>
+              <a:rPr lang="pl-PL" sz="1800" dirty="0" smtClean="0"/>
+              <a:t>Wyszła Ci jakaś zależność </a:t>
+            </a:r>
+            <a:r>
+              <a:rPr lang="pl-PL" sz="1800" dirty="0"/>
+              <a:t>(np., że „Y” zależy od „X3</a:t>
+            </a:r>
+            <a:r>
+              <a:rPr lang="pl-PL" sz="1800" dirty="0" smtClean="0"/>
+              <a:t>”, a ich „</a:t>
+            </a:r>
+            <a:r>
+              <a:rPr lang="el-GR" sz="1800" dirty="0"/>
+              <a:t> </a:t>
+            </a:r>
+            <a:r>
+              <a:rPr lang="el-GR" sz="1800" dirty="0" smtClean="0"/>
+              <a:t>β</a:t>
+            </a:r>
+            <a:r>
+              <a:rPr lang="pl-PL" sz="1800" dirty="0" smtClean="0"/>
+              <a:t>” to np. 4,5). </a:t>
+            </a:r>
+          </a:p>
+          <a:p>
+            <a:pPr marL="0" indent="0">
+              <a:buNone/>
+            </a:pPr>
+            <a:r>
+              <a:rPr lang="pl-PL" sz="1800" dirty="0" smtClean="0"/>
+              <a:t>Załóżmy, że to, co myślisz to nieprawda, tzn. że „Y” nie zależy od „X3”. </a:t>
+            </a:r>
+          </a:p>
+          <a:p>
+            <a:pPr marL="0" indent="0">
+              <a:buNone/>
+            </a:pPr>
+            <a:r>
+              <a:rPr lang="pl-PL" sz="1800" dirty="0" smtClean="0"/>
+              <a:t>Zapytasz się: „Ale po co tak zakładać? Przecież „</a:t>
+            </a:r>
+            <a:r>
+              <a:rPr lang="el-GR" sz="1800" dirty="0"/>
+              <a:t> </a:t>
+            </a:r>
+            <a:r>
+              <a:rPr lang="el-GR" sz="1800" dirty="0" smtClean="0"/>
+              <a:t>β</a:t>
+            </a:r>
+            <a:r>
+              <a:rPr lang="pl-PL" sz="1800" dirty="0" smtClean="0"/>
+              <a:t>” jest 4,5! Jest zależność i nara!”</a:t>
+            </a:r>
+          </a:p>
+          <a:p>
+            <a:pPr marL="0" indent="0">
+              <a:buNone/>
+            </a:pPr>
+            <a:r>
+              <a:rPr lang="pl-PL" sz="1800" dirty="0" smtClean="0"/>
+              <a:t>A ja Ci odpowiem: 	„A co jeżeli wylosowałeś akurat skrajną próbkę, a jej skrajność polega na tym, że jest </a:t>
+            </a:r>
+          </a:p>
+          <a:p>
+            <a:pPr marL="0" indent="0">
+              <a:buNone/>
+            </a:pPr>
+            <a:r>
+              <a:rPr lang="pl-PL" sz="1800" dirty="0"/>
+              <a:t>	</a:t>
+            </a:r>
+            <a:r>
+              <a:rPr lang="pl-PL" sz="1800" dirty="0" smtClean="0"/>
+              <a:t>	w niej </a:t>
+            </a:r>
+            <a:r>
+              <a:rPr lang="el-GR" sz="1800" dirty="0" smtClean="0"/>
+              <a:t> β</a:t>
+            </a:r>
+            <a:r>
+              <a:rPr lang="pl-PL" sz="1800" dirty="0" smtClean="0"/>
+              <a:t>==4,5 ?”</a:t>
+            </a:r>
+          </a:p>
+          <a:p>
+            <a:pPr marL="0" indent="0">
+              <a:buNone/>
+            </a:pPr>
+            <a:r>
+              <a:rPr lang="pl-PL" sz="1800" dirty="0" smtClean="0"/>
+              <a:t>P value to prawdopodobieństwo takiej sytuacji.</a:t>
+            </a:r>
+          </a:p>
+          <a:p>
+            <a:pPr marL="0" indent="0">
+              <a:buNone/>
+            </a:pPr>
+            <a:r>
+              <a:rPr lang="pl-PL" sz="1800" dirty="0" smtClean="0"/>
+              <a:t>Zapytasz: jakim cudem można to policzyć?</a:t>
+            </a:r>
+          </a:p>
+          <a:p>
+            <a:pPr marL="0" indent="0">
+              <a:buNone/>
+            </a:pPr>
+            <a:r>
+              <a:rPr lang="pl-PL" sz="1800" dirty="0" smtClean="0"/>
+              <a:t>Ja na to: ano mamy estymatory (które mają swoje rozkłady zależne od założeń (np. założenia, że </a:t>
+            </a:r>
+            <a:r>
+              <a:rPr lang="el-GR" sz="1800" dirty="0" smtClean="0"/>
+              <a:t> β</a:t>
+            </a:r>
+            <a:r>
+              <a:rPr lang="pl-PL" sz="1800" dirty="0" smtClean="0"/>
+              <a:t>==</a:t>
+            </a:r>
+            <a:r>
+              <a:rPr lang="pl-PL" sz="1800" smtClean="0"/>
+              <a:t>0).</a:t>
+            </a:r>
+            <a:endParaRPr lang="pl-PL" sz="1800" dirty="0"/>
+          </a:p>
+          <a:p>
+            <a:endParaRPr lang="pl-PL" sz="1800" dirty="0"/>
+          </a:p>
+        </p:txBody>
+      </p:sp>
+    </p:spTree>
+    <p:extLst>
+      <p:ext uri="{BB962C8B-B14F-4D97-AF65-F5344CB8AC3E}">
+        <p14:creationId xmlns:p14="http://schemas.microsoft.com/office/powerpoint/2010/main" val="3956381593"/>
+      </p:ext>
+    </p:extLst>
+  </p:cSld>
+  <p:clrMapOvr>
+    <a:masterClrMapping/>
+  </p:clrMapOvr>
+</p:sld>
+</file>
+
 <file path=ppt/theme/theme1.xml><?xml version="1.0" encoding="utf-8"?>
 <a:theme xmlns:a="http://schemas.openxmlformats.org/drawingml/2006/main" name="Office Theme">
   <a:themeElements>

</xml_diff>